<commit_message>
Added document and fixed style issues.
</commit_message>
<xml_diff>
--- a/ex01/sequence diagrams.pptx
+++ b/ex01/sequence diagrams.pptx
@@ -4402,7 +4402,6 @@
               <a:rPr lang="en-US" sz="1400" dirty="0" smtClean="0"/>
               <a:t>Posts</a:t>
             </a:r>
-            <a:endParaRPr lang="en-US" sz="1400" dirty="0" smtClean="0"/>
           </a:p>
         </p:txBody>
       </p:sp>
@@ -4431,8 +4430,9 @@
             <a:pPr algn="ctr"/>
             <a:r>
               <a:rPr lang="en-US" dirty="0" smtClean="0"/>
-              <a:t>Comment Sequence</a:t>
+              <a:t>Interest check Sequence diagram</a:t>
             </a:r>
+            <a:endParaRPr lang="en-US" dirty="0" smtClean="0"/>
           </a:p>
         </p:txBody>
       </p:sp>
@@ -4656,7 +4656,6 @@
               <a:rPr lang="en-US" sz="1400" dirty="0" smtClean="0"/>
               <a:t>Users</a:t>
             </a:r>
-            <a:endParaRPr lang="en-US" sz="1400" dirty="0" smtClean="0"/>
           </a:p>
         </p:txBody>
       </p:sp>
@@ -5022,7 +5021,6 @@
               <a:rPr lang="en-US" sz="1400" dirty="0" smtClean="0"/>
               <a:t>Users</a:t>
             </a:r>
-            <a:endParaRPr lang="en-US" sz="1400" dirty="0" smtClean="0"/>
           </a:p>
         </p:txBody>
       </p:sp>
@@ -5203,7 +5201,6 @@
               <a:rPr lang="en-US" sz="1400" dirty="0" smtClean="0"/>
               <a:t>()</a:t>
             </a:r>
-            <a:endParaRPr lang="en-US" sz="1400" dirty="0" smtClean="0"/>
           </a:p>
         </p:txBody>
       </p:sp>

</xml_diff>

<commit_message>
updated doc with builder pattern, diagrams for singleton pattern and description of async work.
</commit_message>
<xml_diff>
--- a/ex01/sequence diagrams.pptx
+++ b/ex01/sequence diagrams.pptx
@@ -3419,7 +3419,7 @@
         </p:nvCxnSpPr>
         <p:spPr>
           <a:xfrm flipH="1">
-            <a:off x="6167991" y="1572441"/>
+            <a:off x="7093149" y="1572441"/>
             <a:ext cx="38274" cy="5059271"/>
           </a:xfrm>
           <a:prstGeom prst="line">
@@ -3455,7 +3455,7 @@
         </p:nvSpPr>
         <p:spPr>
           <a:xfrm>
-            <a:off x="-207962" y="1037514"/>
+            <a:off x="717196" y="1037514"/>
             <a:ext cx="2141850" cy="502760"/>
           </a:xfrm>
           <a:prstGeom prst="rect">
@@ -3515,8 +3515,8 @@
         </p:nvCxnSpPr>
         <p:spPr>
           <a:xfrm flipH="1">
-            <a:off x="773921" y="1540274"/>
-            <a:ext cx="89042" cy="5073897"/>
+            <a:off x="1753496" y="1540274"/>
+            <a:ext cx="34625" cy="5054164"/>
           </a:xfrm>
           <a:prstGeom prst="line">
             <a:avLst/>
@@ -3551,7 +3551,7 @@
         </p:nvSpPr>
         <p:spPr>
           <a:xfrm>
-            <a:off x="2795282" y="986594"/>
+            <a:off x="3720440" y="986594"/>
             <a:ext cx="1538164" cy="502760"/>
           </a:xfrm>
           <a:prstGeom prst="rect">
@@ -3611,7 +3611,7 @@
         </p:nvCxnSpPr>
         <p:spPr>
           <a:xfrm>
-            <a:off x="3564364" y="1489354"/>
+            <a:off x="4489522" y="1489354"/>
             <a:ext cx="17932" cy="5137357"/>
           </a:xfrm>
           <a:prstGeom prst="line">
@@ -3647,7 +3647,7 @@
         </p:nvGrpSpPr>
         <p:grpSpPr>
           <a:xfrm>
-            <a:off x="842353" y="1819112"/>
+            <a:off x="1767511" y="1819112"/>
             <a:ext cx="5643434" cy="3572828"/>
             <a:chOff x="2736132" y="897200"/>
             <a:chExt cx="7258679" cy="1048646"/>
@@ -3833,7 +3833,7 @@
         </p:nvSpPr>
         <p:spPr>
           <a:xfrm>
-            <a:off x="5636440" y="1075569"/>
+            <a:off x="6561598" y="1075569"/>
             <a:ext cx="1134956" cy="502760"/>
           </a:xfrm>
           <a:prstGeom prst="rect">
@@ -3891,7 +3891,7 @@
         </p:nvSpPr>
         <p:spPr>
           <a:xfrm>
-            <a:off x="2313454" y="184151"/>
+            <a:off x="3238612" y="184151"/>
             <a:ext cx="5218535" cy="369332"/>
           </a:xfrm>
           <a:prstGeom prst="rect">
@@ -3921,7 +3921,7 @@
         </p:nvGrpSpPr>
         <p:grpSpPr>
           <a:xfrm>
-            <a:off x="3645063" y="2306509"/>
+            <a:off x="4570221" y="2306509"/>
             <a:ext cx="2619869" cy="1261303"/>
             <a:chOff x="2767887" y="897200"/>
             <a:chExt cx="3575041" cy="1048646"/>
@@ -4057,7 +4057,7 @@
         </p:nvCxnSpPr>
         <p:spPr>
           <a:xfrm flipH="1" flipV="1">
-            <a:off x="830091" y="6232307"/>
+            <a:off x="1755249" y="6232307"/>
             <a:ext cx="665493" cy="6830"/>
           </a:xfrm>
           <a:prstGeom prst="straightConnector1">
@@ -4093,7 +4093,7 @@
         </p:nvCxnSpPr>
         <p:spPr>
           <a:xfrm flipH="1" flipV="1">
-            <a:off x="1495584" y="5740558"/>
+            <a:off x="2420742" y="5740558"/>
             <a:ext cx="1" cy="504978"/>
           </a:xfrm>
           <a:prstGeom prst="line">
@@ -4129,7 +4129,7 @@
         </p:nvCxnSpPr>
         <p:spPr>
           <a:xfrm flipH="1">
-            <a:off x="853273" y="5761224"/>
+            <a:off x="1778431" y="5761224"/>
             <a:ext cx="642311" cy="0"/>
           </a:xfrm>
           <a:prstGeom prst="line">
@@ -4165,7 +4165,7 @@
         </p:nvSpPr>
         <p:spPr>
           <a:xfrm>
-            <a:off x="2485815" y="5273941"/>
+            <a:off x="3410973" y="5273941"/>
             <a:ext cx="1742594" cy="307777"/>
           </a:xfrm>
           <a:prstGeom prst="rect">
@@ -4196,7 +4196,7 @@
         </p:nvGrpSpPr>
         <p:grpSpPr>
           <a:xfrm>
-            <a:off x="3632448" y="3957573"/>
+            <a:off x="4557606" y="3957573"/>
             <a:ext cx="2619869" cy="1261303"/>
             <a:chOff x="2767887" y="897200"/>
             <a:chExt cx="3575041" cy="1048646"/>
@@ -4332,7 +4332,7 @@
         </p:nvSpPr>
         <p:spPr>
           <a:xfrm>
-            <a:off x="5614490" y="3503731"/>
+            <a:off x="6539648" y="3503731"/>
             <a:ext cx="1742594" cy="307777"/>
           </a:xfrm>
           <a:prstGeom prst="rect">
@@ -4363,7 +4363,7 @@
         </p:nvSpPr>
         <p:spPr>
           <a:xfrm>
-            <a:off x="3673842" y="3728731"/>
+            <a:off x="4599000" y="3728731"/>
             <a:ext cx="2840724" cy="307779"/>
           </a:xfrm>
           <a:prstGeom prst="rect">
@@ -4398,7 +4398,7 @@
         </p:nvSpPr>
         <p:spPr>
           <a:xfrm>
-            <a:off x="5609922" y="5128563"/>
+            <a:off x="6535080" y="5128563"/>
             <a:ext cx="1742594" cy="307777"/>
           </a:xfrm>
           <a:prstGeom prst="rect">
@@ -4429,7 +4429,7 @@
         </p:nvSpPr>
         <p:spPr>
           <a:xfrm>
-            <a:off x="2046832" y="1679639"/>
+            <a:off x="2971990" y="1679639"/>
             <a:ext cx="2840724" cy="234094"/>
           </a:xfrm>
           <a:prstGeom prst="rect">
@@ -4464,7 +4464,7 @@
         </p:nvSpPr>
         <p:spPr>
           <a:xfrm>
-            <a:off x="1432343" y="5684153"/>
+            <a:off x="2357501" y="5684153"/>
             <a:ext cx="1742594" cy="307777"/>
           </a:xfrm>
           <a:prstGeom prst="rect">

</xml_diff>

<commit_message>
fixed class diagram arrows.
</commit_message>
<xml_diff>
--- a/ex01/sequence diagrams.pptx
+++ b/ex01/sequence diagrams.pptx
@@ -259,7 +259,7 @@
           <a:p>
             <a:fld id="{0FAAEC13-6DF5-4349-BFA7-71AE5D1BD1E4}" type="datetimeFigureOut">
               <a:rPr lang="he-IL" smtClean="0"/>
-              <a:t>ז'/טבת/תשע"ה</a:t>
+              <a:t>י"ב/טבת/תשע"ה</a:t>
             </a:fld>
             <a:endParaRPr lang="he-IL"/>
           </a:p>
@@ -429,7 +429,7 @@
           <a:p>
             <a:fld id="{0FAAEC13-6DF5-4349-BFA7-71AE5D1BD1E4}" type="datetimeFigureOut">
               <a:rPr lang="he-IL" smtClean="0"/>
-              <a:t>ז'/טבת/תשע"ה</a:t>
+              <a:t>י"ב/טבת/תשע"ה</a:t>
             </a:fld>
             <a:endParaRPr lang="he-IL"/>
           </a:p>
@@ -609,7 +609,7 @@
           <a:p>
             <a:fld id="{0FAAEC13-6DF5-4349-BFA7-71AE5D1BD1E4}" type="datetimeFigureOut">
               <a:rPr lang="he-IL" smtClean="0"/>
-              <a:t>ז'/טבת/תשע"ה</a:t>
+              <a:t>י"ב/טבת/תשע"ה</a:t>
             </a:fld>
             <a:endParaRPr lang="he-IL"/>
           </a:p>
@@ -779,7 +779,7 @@
           <a:p>
             <a:fld id="{0FAAEC13-6DF5-4349-BFA7-71AE5D1BD1E4}" type="datetimeFigureOut">
               <a:rPr lang="he-IL" smtClean="0"/>
-              <a:t>ז'/טבת/תשע"ה</a:t>
+              <a:t>י"ב/טבת/תשע"ה</a:t>
             </a:fld>
             <a:endParaRPr lang="he-IL"/>
           </a:p>
@@ -1025,7 +1025,7 @@
           <a:p>
             <a:fld id="{0FAAEC13-6DF5-4349-BFA7-71AE5D1BD1E4}" type="datetimeFigureOut">
               <a:rPr lang="he-IL" smtClean="0"/>
-              <a:t>ז'/טבת/תשע"ה</a:t>
+              <a:t>י"ב/טבת/תשע"ה</a:t>
             </a:fld>
             <a:endParaRPr lang="he-IL"/>
           </a:p>
@@ -1257,7 +1257,7 @@
           <a:p>
             <a:fld id="{0FAAEC13-6DF5-4349-BFA7-71AE5D1BD1E4}" type="datetimeFigureOut">
               <a:rPr lang="he-IL" smtClean="0"/>
-              <a:t>ז'/טבת/תשע"ה</a:t>
+              <a:t>י"ב/טבת/תשע"ה</a:t>
             </a:fld>
             <a:endParaRPr lang="he-IL"/>
           </a:p>
@@ -1624,7 +1624,7 @@
           <a:p>
             <a:fld id="{0FAAEC13-6DF5-4349-BFA7-71AE5D1BD1E4}" type="datetimeFigureOut">
               <a:rPr lang="he-IL" smtClean="0"/>
-              <a:t>ז'/טבת/תשע"ה</a:t>
+              <a:t>י"ב/טבת/תשע"ה</a:t>
             </a:fld>
             <a:endParaRPr lang="he-IL"/>
           </a:p>
@@ -1742,7 +1742,7 @@
           <a:p>
             <a:fld id="{0FAAEC13-6DF5-4349-BFA7-71AE5D1BD1E4}" type="datetimeFigureOut">
               <a:rPr lang="he-IL" smtClean="0"/>
-              <a:t>ז'/טבת/תשע"ה</a:t>
+              <a:t>י"ב/טבת/תשע"ה</a:t>
             </a:fld>
             <a:endParaRPr lang="he-IL"/>
           </a:p>
@@ -1837,7 +1837,7 @@
           <a:p>
             <a:fld id="{0FAAEC13-6DF5-4349-BFA7-71AE5D1BD1E4}" type="datetimeFigureOut">
               <a:rPr lang="he-IL" smtClean="0"/>
-              <a:t>ז'/טבת/תשע"ה</a:t>
+              <a:t>י"ב/טבת/תשע"ה</a:t>
             </a:fld>
             <a:endParaRPr lang="he-IL"/>
           </a:p>
@@ -2114,7 +2114,7 @@
           <a:p>
             <a:fld id="{0FAAEC13-6DF5-4349-BFA7-71AE5D1BD1E4}" type="datetimeFigureOut">
               <a:rPr lang="he-IL" smtClean="0"/>
-              <a:t>ז'/טבת/תשע"ה</a:t>
+              <a:t>י"ב/טבת/תשע"ה</a:t>
             </a:fld>
             <a:endParaRPr lang="he-IL"/>
           </a:p>
@@ -2367,7 +2367,7 @@
           <a:p>
             <a:fld id="{0FAAEC13-6DF5-4349-BFA7-71AE5D1BD1E4}" type="datetimeFigureOut">
               <a:rPr lang="he-IL" smtClean="0"/>
-              <a:t>ז'/טבת/תשע"ה</a:t>
+              <a:t>י"ב/טבת/תשע"ה</a:t>
             </a:fld>
             <a:endParaRPr lang="he-IL"/>
           </a:p>
@@ -2580,7 +2580,7 @@
           <a:p>
             <a:fld id="{0FAAEC13-6DF5-4349-BFA7-71AE5D1BD1E4}" type="datetimeFigureOut">
               <a:rPr lang="he-IL" smtClean="0"/>
-              <a:t>ז'/טבת/תשע"ה</a:t>
+              <a:t>י"ב/טבת/תשע"ה</a:t>
             </a:fld>
             <a:endParaRPr lang="he-IL"/>
           </a:p>
@@ -3820,7 +3820,6 @@
                 <a:rPr lang="en-US" sz="1400" dirty="0" smtClean="0"/>
                 <a:t>(status)</a:t>
               </a:r>
-              <a:endParaRPr lang="en-US" sz="1400" dirty="0" smtClean="0"/>
             </a:p>
           </p:txBody>
         </p:sp>
@@ -4184,7 +4183,6 @@
               <a:rPr lang="en-US" sz="1400" dirty="0" smtClean="0"/>
               <a:t>(was posted)</a:t>
             </a:r>
-            <a:endParaRPr lang="en-US" sz="1400" dirty="0" smtClean="0"/>
           </a:p>
         </p:txBody>
       </p:sp>
@@ -4351,7 +4349,6 @@
               <a:rPr lang="en-US" sz="1400" dirty="0" smtClean="0"/>
               <a:t>(void)</a:t>
             </a:r>
-            <a:endParaRPr lang="en-US" sz="1400" dirty="0" smtClean="0"/>
           </a:p>
         </p:txBody>
       </p:sp>
@@ -4386,7 +4383,6 @@
               <a:rPr lang="en-US" sz="1400" dirty="0" smtClean="0"/>
               <a:t>()</a:t>
             </a:r>
-            <a:endParaRPr lang="en-US" sz="1400" dirty="0" smtClean="0"/>
           </a:p>
         </p:txBody>
       </p:sp>
@@ -4417,7 +4413,6 @@
               <a:rPr lang="en-US" sz="1400" dirty="0" smtClean="0"/>
               <a:t>(void)</a:t>
             </a:r>
-            <a:endParaRPr lang="en-US" sz="1400" dirty="0" smtClean="0"/>
           </a:p>
         </p:txBody>
       </p:sp>
@@ -4452,7 +4447,6 @@
               <a:rPr lang="en-US" sz="1400" dirty="0" smtClean="0"/>
               <a:t>(status)</a:t>
             </a:r>
-            <a:endParaRPr lang="en-US" sz="1400" dirty="0" smtClean="0"/>
           </a:p>
         </p:txBody>
       </p:sp>
@@ -7579,15 +7573,13 @@
       <p:cxnSp>
         <p:nvCxnSpPr>
           <p:cNvPr id="150" name="Straight Arrow Connector 149"/>
-          <p:cNvCxnSpPr>
-            <a:endCxn id="3" idx="1"/>
-          </p:cNvCxnSpPr>
+          <p:cNvCxnSpPr/>
           <p:nvPr/>
         </p:nvCxnSpPr>
         <p:spPr>
           <a:xfrm flipV="1">
-            <a:off x="2531315" y="1261168"/>
-            <a:ext cx="5050263" cy="3997973"/>
+            <a:off x="2531315" y="1672046"/>
+            <a:ext cx="5050262" cy="3587096"/>
           </a:xfrm>
           <a:prstGeom prst="straightConnector1">
             <a:avLst/>
@@ -8927,10 +8919,6 @@
                 <a:rPr lang="en-US" sz="1400" dirty="0" smtClean="0"/>
                 <a:t>Comment</a:t>
               </a:r>
-              <a:r>
-                <a:rPr lang="en-US" sz="1400" dirty="0" smtClean="0"/>
-                <a:t/>
-              </a:r>
               <a:br>
                 <a:rPr lang="en-US" sz="1400" dirty="0" smtClean="0"/>
               </a:br>
@@ -9248,14 +9236,13 @@
           <p:cNvPr id="73" name="Straight Arrow Connector 72"/>
           <p:cNvCxnSpPr>
             <a:stCxn id="43" idx="3"/>
-            <a:endCxn id="3" idx="1"/>
           </p:cNvCxnSpPr>
           <p:nvPr/>
         </p:nvCxnSpPr>
         <p:spPr>
           <a:xfrm>
             <a:off x="2201711" y="978511"/>
-            <a:ext cx="5379867" cy="282657"/>
+            <a:ext cx="5379866" cy="198515"/>
           </a:xfrm>
           <a:prstGeom prst="straightConnector1">
             <a:avLst/>
@@ -9326,14 +9313,13 @@
           <p:cNvPr id="79" name="Straight Arrow Connector 78"/>
           <p:cNvCxnSpPr>
             <a:stCxn id="65" idx="3"/>
-            <a:endCxn id="3" idx="1"/>
           </p:cNvCxnSpPr>
           <p:nvPr/>
         </p:nvCxnSpPr>
         <p:spPr>
           <a:xfrm flipV="1">
-            <a:off x="2396077" y="1261168"/>
-            <a:ext cx="5185501" cy="2384237"/>
+            <a:off x="2396077" y="1432888"/>
+            <a:ext cx="5185500" cy="2212517"/>
           </a:xfrm>
           <a:prstGeom prst="straightConnector1">
             <a:avLst/>
@@ -9585,14 +9571,13 @@
           <p:cNvPr id="89" name="Straight Arrow Connector 88"/>
           <p:cNvCxnSpPr>
             <a:stCxn id="83" idx="0"/>
-            <a:endCxn id="3" idx="2"/>
           </p:cNvCxnSpPr>
           <p:nvPr/>
         </p:nvCxnSpPr>
         <p:spPr>
           <a:xfrm flipH="1" flipV="1">
-            <a:off x="8711809" y="2298257"/>
-            <a:ext cx="2334501" cy="2257292"/>
+            <a:off x="8900160" y="2294286"/>
+            <a:ext cx="2146150" cy="2261263"/>
           </a:xfrm>
           <a:prstGeom prst="straightConnector1">
             <a:avLst/>
@@ -9884,14 +9869,13 @@
           <p:cNvPr id="102" name="Straight Arrow Connector 101"/>
           <p:cNvCxnSpPr>
             <a:stCxn id="98" idx="0"/>
-            <a:endCxn id="3" idx="2"/>
           </p:cNvCxnSpPr>
           <p:nvPr/>
         </p:nvCxnSpPr>
         <p:spPr>
-          <a:xfrm flipH="1" flipV="1">
-            <a:off x="8711809" y="2298257"/>
-            <a:ext cx="81042" cy="2215680"/>
+          <a:xfrm flipV="1">
+            <a:off x="8792851" y="2294286"/>
+            <a:ext cx="46349" cy="2219651"/>
           </a:xfrm>
           <a:prstGeom prst="straightConnector1">
             <a:avLst/>
@@ -10155,14 +10139,13 @@
           <p:cNvPr id="112" name="Straight Arrow Connector 111"/>
           <p:cNvCxnSpPr>
             <a:stCxn id="106" idx="3"/>
-            <a:endCxn id="8" idx="2"/>
           </p:cNvCxnSpPr>
           <p:nvPr/>
         </p:nvCxnSpPr>
         <p:spPr>
           <a:xfrm flipV="1">
-            <a:off x="4689195" y="2294286"/>
-            <a:ext cx="4022614" cy="3465356"/>
+            <a:off x="4689195" y="2313305"/>
+            <a:ext cx="3255170" cy="3446337"/>
           </a:xfrm>
           <a:prstGeom prst="straightConnector1">
             <a:avLst/>
@@ -10436,14 +10419,13 @@
           <p:cNvPr id="120" name="Straight Arrow Connector 119"/>
           <p:cNvCxnSpPr>
             <a:stCxn id="114" idx="3"/>
-            <a:endCxn id="3" idx="2"/>
           </p:cNvCxnSpPr>
           <p:nvPr/>
         </p:nvCxnSpPr>
         <p:spPr>
           <a:xfrm flipV="1">
-            <a:off x="6596684" y="2298257"/>
-            <a:ext cx="2115125" cy="1879097"/>
+            <a:off x="6596684" y="2294286"/>
+            <a:ext cx="1780962" cy="1883068"/>
           </a:xfrm>
           <a:prstGeom prst="straightConnector1">
             <a:avLst/>
@@ -10702,15 +10684,14 @@
         <p:nvCxnSpPr>
           <p:cNvPr id="128" name="Straight Arrow Connector 127"/>
           <p:cNvCxnSpPr>
-            <a:stCxn id="122" idx="3"/>
             <a:endCxn id="3" idx="2"/>
           </p:cNvCxnSpPr>
           <p:nvPr/>
         </p:nvCxnSpPr>
         <p:spPr>
           <a:xfrm flipV="1">
-            <a:off x="7160635" y="2298257"/>
-            <a:ext cx="1551174" cy="3629677"/>
+            <a:off x="7147316" y="2298257"/>
+            <a:ext cx="1564493" cy="3666639"/>
           </a:xfrm>
           <a:prstGeom prst="straightConnector1">
             <a:avLst/>

</xml_diff>